<commit_message>
final slides for gg000
</commit_message>
<xml_diff>
--- a/Slides/gg000-HelloTriangle.pptx
+++ b/Slides/gg000-HelloTriangle.pptx
@@ -5,7 +5,7 @@
     <p:sldMasterId id="2147483648" r:id="rId1"/>
   </p:sldMasterIdLst>
   <p:notesMasterIdLst>
-    <p:notesMasterId r:id="rId63"/>
+    <p:notesMasterId r:id="rId62"/>
   </p:notesMasterIdLst>
   <p:sldIdLst>
     <p:sldId id="256" r:id="rId2"/>
@@ -66,9 +66,8 @@
     <p:sldId id="499" r:id="rId57"/>
     <p:sldId id="500" r:id="rId58"/>
     <p:sldId id="501" r:id="rId59"/>
-    <p:sldId id="502" r:id="rId60"/>
-    <p:sldId id="439" r:id="rId61"/>
-    <p:sldId id="404" r:id="rId62"/>
+    <p:sldId id="503" r:id="rId60"/>
+    <p:sldId id="502" r:id="rId61"/>
   </p:sldIdLst>
   <p:sldSz cx="9144000" cy="6858000" type="screen4x3"/>
   <p:notesSz cx="6858000" cy="9144000"/>
@@ -15520,7 +15519,7 @@
         <p:spPr/>
         <p:txBody>
           <a:bodyPr>
-            <a:normAutofit fontScale="92500" lnSpcReduction="20000"/>
+            <a:normAutofit/>
           </a:bodyPr>
           <a:lstStyle/>
           <a:p>
@@ -23109,6 +23108,252 @@
           <a:lstStyle/>
           <a:p>
             <a:r>
+              <a:rPr lang="en-US" dirty="0" err="1"/>
+              <a:t>Itt</a:t>
+            </a:r>
+            <a:r>
+              <a:rPr lang="en-US" dirty="0"/>
+              <a:t> a </a:t>
+            </a:r>
+            <a:r>
+              <a:rPr lang="en-US" dirty="0" err="1"/>
+              <a:t>bevezető</a:t>
+            </a:r>
+            <a:r>
+              <a:rPr lang="en-US" dirty="0"/>
+              <a:t> </a:t>
+            </a:r>
+            <a:r>
+              <a:rPr lang="en-US" dirty="0" err="1"/>
+              <a:t>feladatoknál</a:t>
+            </a:r>
+            <a:r>
+              <a:rPr lang="en-US" dirty="0"/>
+              <a:t> ne </a:t>
+            </a:r>
+            <a:r>
+              <a:rPr lang="en-US" dirty="0" err="1"/>
+              <a:t>gondold</a:t>
+            </a:r>
+            <a:r>
+              <a:rPr lang="en-US" dirty="0"/>
+              <a:t> </a:t>
+            </a:r>
+            <a:r>
+              <a:rPr lang="en-US" dirty="0" err="1"/>
+              <a:t>túl</a:t>
+            </a:r>
+            <a:r>
+              <a:rPr lang="en-US" dirty="0"/>
+              <a:t> a </a:t>
+            </a:r>
+            <a:r>
+              <a:rPr lang="en-US" dirty="0" err="1"/>
+              <a:t>dolgot</a:t>
+            </a:r>
+            <a:r>
+              <a:rPr lang="en-US" dirty="0"/>
+              <a:t>, </a:t>
+            </a:r>
+            <a:r>
+              <a:rPr lang="en-US" dirty="0" err="1"/>
+              <a:t>tényleg</a:t>
+            </a:r>
+            <a:r>
+              <a:rPr lang="en-US" dirty="0"/>
+              <a:t> </a:t>
+            </a:r>
+            <a:r>
+              <a:rPr lang="en-US" dirty="0" err="1"/>
+              <a:t>csak</a:t>
+            </a:r>
+            <a:r>
+              <a:rPr lang="en-US" dirty="0"/>
+              <a:t> </a:t>
+            </a:r>
+            <a:r>
+              <a:rPr lang="en-US" dirty="0" err="1"/>
+              <a:t>annyit</a:t>
+            </a:r>
+            <a:r>
+              <a:rPr lang="en-US" dirty="0"/>
+              <a:t> </a:t>
+            </a:r>
+            <a:r>
+              <a:rPr lang="en-US" dirty="0" err="1"/>
+              <a:t>csinálj</a:t>
+            </a:r>
+            <a:r>
+              <a:rPr lang="en-US" dirty="0"/>
+              <a:t> </a:t>
+            </a:r>
+            <a:r>
+              <a:rPr lang="en-US" dirty="0" err="1"/>
+              <a:t>amennyit</a:t>
+            </a:r>
+            <a:r>
+              <a:rPr lang="en-US" dirty="0"/>
+              <a:t> </a:t>
+            </a:r>
+            <a:r>
+              <a:rPr lang="en-US" dirty="0" err="1"/>
+              <a:t>kér</a:t>
+            </a:r>
+            <a:r>
+              <a:rPr lang="en-US" dirty="0"/>
+              <a:t> a </a:t>
+            </a:r>
+            <a:r>
+              <a:rPr lang="en-US" dirty="0" err="1"/>
+              <a:t>feladat</a:t>
+            </a:r>
+            <a:r>
+              <a:rPr lang="en-US" dirty="0"/>
+              <a:t>.</a:t>
+            </a:r>
+          </a:p>
+          <a:p>
+            <a:endParaRPr lang="en-US" dirty="0"/>
+          </a:p>
+          <a:p>
+            <a:r>
+              <a:rPr lang="en-US" dirty="0"/>
+              <a:t>A </a:t>
+            </a:r>
+            <a:r>
+              <a:rPr lang="en-US" dirty="0" err="1"/>
+              <a:t>színt</a:t>
+            </a:r>
+            <a:r>
+              <a:rPr lang="en-US" dirty="0"/>
+              <a:t> 0 </a:t>
+            </a:r>
+            <a:r>
+              <a:rPr lang="en-US" dirty="0" err="1"/>
+              <a:t>és</a:t>
+            </a:r>
+            <a:r>
+              <a:rPr lang="en-US" dirty="0"/>
+              <a:t> 1 </a:t>
+            </a:r>
+            <a:r>
+              <a:rPr lang="en-US" dirty="0" err="1"/>
+              <a:t>közötti</a:t>
+            </a:r>
+            <a:r>
+              <a:rPr lang="en-US" dirty="0"/>
+              <a:t> float </a:t>
+            </a:r>
+            <a:r>
+              <a:rPr lang="en-US" dirty="0" err="1"/>
+              <a:t>értékekkel</a:t>
+            </a:r>
+            <a:r>
+              <a:rPr lang="en-US" dirty="0"/>
+              <a:t> add meg </a:t>
+            </a:r>
+            <a:r>
+              <a:rPr lang="en-US" dirty="0" err="1"/>
+              <a:t>és</a:t>
+            </a:r>
+            <a:r>
+              <a:rPr lang="en-US" dirty="0"/>
+              <a:t> </a:t>
+            </a:r>
+            <a:r>
+              <a:rPr lang="en-US" dirty="0" err="1"/>
+              <a:t>tegyük</a:t>
+            </a:r>
+            <a:r>
+              <a:rPr lang="en-US" dirty="0"/>
+              <a:t> </a:t>
+            </a:r>
+            <a:r>
+              <a:rPr lang="en-US" dirty="0" err="1"/>
+              <a:t>fel</a:t>
+            </a:r>
+            <a:r>
+              <a:rPr lang="en-US" dirty="0"/>
+              <a:t>, </a:t>
+            </a:r>
+            <a:r>
+              <a:rPr lang="en-US" dirty="0" err="1"/>
+              <a:t>hogy</a:t>
+            </a:r>
+            <a:r>
+              <a:rPr lang="en-US" dirty="0"/>
+              <a:t> RGB a </a:t>
+            </a:r>
+            <a:r>
+              <a:rPr lang="en-US" dirty="0" err="1"/>
+              <a:t>sorrend</a:t>
+            </a:r>
+            <a:r>
+              <a:rPr lang="en-US" dirty="0"/>
+              <a:t> (</a:t>
+            </a:r>
+            <a:r>
+              <a:rPr lang="en-US" dirty="0" err="1"/>
+              <a:t>ez</a:t>
+            </a:r>
+            <a:r>
+              <a:rPr lang="en-US" dirty="0"/>
+              <a:t> </a:t>
+            </a:r>
+            <a:r>
+              <a:rPr lang="en-US" dirty="0" err="1"/>
+              <a:t>utóbbit</a:t>
+            </a:r>
+            <a:r>
+              <a:rPr lang="en-US" dirty="0"/>
+              <a:t> </a:t>
+            </a:r>
+            <a:r>
+              <a:rPr lang="en-US" dirty="0" err="1"/>
+              <a:t>sehol</a:t>
+            </a:r>
+            <a:r>
+              <a:rPr lang="en-US" dirty="0"/>
+              <a:t> </a:t>
+            </a:r>
+            <a:r>
+              <a:rPr lang="en-US" dirty="0" err="1"/>
+              <a:t>nem</a:t>
+            </a:r>
+            <a:r>
+              <a:rPr lang="en-US" dirty="0"/>
+              <a:t> </a:t>
+            </a:r>
+            <a:r>
+              <a:rPr lang="en-US" dirty="0" err="1"/>
+              <a:t>kell</a:t>
+            </a:r>
+            <a:r>
+              <a:rPr lang="en-US" dirty="0"/>
+              <a:t> “</a:t>
+            </a:r>
+            <a:r>
+              <a:rPr lang="en-US" dirty="0" err="1"/>
+              <a:t>jelezni</a:t>
+            </a:r>
+            <a:r>
+              <a:rPr lang="en-US" dirty="0"/>
+              <a:t>” a </a:t>
+            </a:r>
+            <a:r>
+              <a:rPr lang="en-US" dirty="0" err="1"/>
+              <a:t>programnak</a:t>
+            </a:r>
+            <a:r>
+              <a:rPr lang="en-US" dirty="0"/>
+              <a:t>).</a:t>
+            </a:r>
+          </a:p>
+          <a:p>
+            <a:endParaRPr lang="en-US" dirty="0"/>
+          </a:p>
+          <a:p>
+            <a:r>
               <a:rPr lang="en-US" dirty="0"/>
               <a:t>A </a:t>
             </a:r>
@@ -23877,6 +24122,27 @@
               <a:t>.</a:t>
             </a:r>
           </a:p>
+          <a:p>
+            <a:endParaRPr lang="en-US" dirty="0"/>
+          </a:p>
+          <a:p>
+            <a:r>
+              <a:rPr lang="en-US" dirty="0" err="1"/>
+              <a:t>Lehetséges</a:t>
+            </a:r>
+            <a:r>
+              <a:rPr lang="en-US" dirty="0"/>
+              <a:t> </a:t>
+            </a:r>
+            <a:r>
+              <a:rPr lang="en-US" dirty="0" err="1"/>
+              <a:t>hibák</a:t>
+            </a:r>
+            <a:r>
+              <a:rPr lang="en-US" dirty="0"/>
+              <a:t>: Copy paste</a:t>
+            </a:r>
+          </a:p>
         </p:txBody>
       </p:sp>
       <p:sp>
@@ -24441,6 +24707,128 @@
               <a:t>.</a:t>
             </a:r>
           </a:p>
+          <a:p>
+            <a:endParaRPr lang="en-US" dirty="0"/>
+          </a:p>
+          <a:p>
+            <a:r>
+              <a:rPr lang="en-US" dirty="0" err="1"/>
+              <a:t>Lehetséges</a:t>
+            </a:r>
+            <a:r>
+              <a:rPr lang="en-US" dirty="0"/>
+              <a:t> </a:t>
+            </a:r>
+            <a:r>
+              <a:rPr lang="en-US" dirty="0" err="1"/>
+              <a:t>hibák</a:t>
+            </a:r>
+            <a:r>
+              <a:rPr lang="en-US" dirty="0"/>
+              <a:t>: </a:t>
+            </a:r>
+            <a:r>
+              <a:rPr lang="en-US" dirty="0" err="1"/>
+              <a:t>rossz</a:t>
+            </a:r>
+            <a:r>
+              <a:rPr lang="en-US" dirty="0"/>
+              <a:t> vertex / pixel </a:t>
+            </a:r>
+            <a:r>
+              <a:rPr lang="en-US" dirty="0" err="1"/>
+              <a:t>shadert</a:t>
+            </a:r>
+            <a:r>
+              <a:rPr lang="en-US" dirty="0"/>
+              <a:t> </a:t>
+            </a:r>
+            <a:r>
+              <a:rPr lang="en-US" dirty="0" err="1"/>
+              <a:t>fordítasz</a:t>
+            </a:r>
+            <a:r>
+              <a:rPr lang="en-US" dirty="0"/>
+              <a:t>, </a:t>
+            </a:r>
+            <a:r>
+              <a:rPr lang="en-US" dirty="0" err="1"/>
+              <a:t>nem</a:t>
+            </a:r>
+            <a:r>
+              <a:rPr lang="en-US" dirty="0"/>
+              <a:t> </a:t>
+            </a:r>
+            <a:r>
+              <a:rPr lang="en-US" dirty="0" err="1"/>
+              <a:t>jó</a:t>
+            </a:r>
+            <a:r>
+              <a:rPr lang="en-US" dirty="0"/>
+              <a:t> </a:t>
+            </a:r>
+            <a:r>
+              <a:rPr lang="en-US" dirty="0" err="1"/>
+              <a:t>változót</a:t>
+            </a:r>
+            <a:r>
+              <a:rPr lang="en-US" dirty="0"/>
+              <a:t> </a:t>
+            </a:r>
+            <a:r>
+              <a:rPr lang="en-US" dirty="0" err="1"/>
+              <a:t>strlen-elsz</a:t>
+            </a:r>
+            <a:r>
+              <a:rPr lang="en-US" dirty="0"/>
+              <a:t> a D3DCompile </a:t>
+            </a:r>
+            <a:r>
+              <a:rPr lang="en-US" dirty="0" err="1"/>
+              <a:t>függvényben</a:t>
+            </a:r>
+            <a:r>
+              <a:rPr lang="en-US" dirty="0"/>
+              <a:t>, </a:t>
+            </a:r>
+            <a:r>
+              <a:rPr lang="en-US" dirty="0" err="1"/>
+              <a:t>rossz</a:t>
+            </a:r>
+            <a:r>
+              <a:rPr lang="en-US" dirty="0"/>
+              <a:t> ID3DBlob-ba </a:t>
+            </a:r>
+            <a:r>
+              <a:rPr lang="en-US" dirty="0" err="1"/>
+              <a:t>teszed</a:t>
+            </a:r>
+            <a:r>
+              <a:rPr lang="en-US" dirty="0"/>
+              <a:t> </a:t>
+            </a:r>
+            <a:r>
+              <a:rPr lang="en-US" dirty="0" err="1"/>
+              <a:t>bele</a:t>
+            </a:r>
+            <a:r>
+              <a:rPr lang="en-US" dirty="0"/>
+              <a:t> a </a:t>
+            </a:r>
+            <a:r>
+              <a:rPr lang="en-US" dirty="0" err="1"/>
+              <a:t>fordított</a:t>
+            </a:r>
+            <a:r>
+              <a:rPr lang="en-US" dirty="0"/>
+              <a:t> </a:t>
+            </a:r>
+            <a:r>
+              <a:rPr lang="en-US" dirty="0" err="1"/>
+              <a:t>shadereket</a:t>
+            </a:r>
+            <a:endParaRPr lang="en-US" dirty="0"/>
+          </a:p>
         </p:txBody>
       </p:sp>
       <p:sp>
@@ -25050,36 +25438,48 @@
           <a:lstStyle/>
           <a:p>
             <a:r>
-              <a:rPr lang="en-US" dirty="0"/>
-              <a:t>Az (1.) </a:t>
-            </a:r>
-            <a:r>
-              <a:rPr lang="en-US" dirty="0" err="1"/>
-              <a:t>részfeladat</a:t>
-            </a:r>
-            <a:r>
-              <a:rPr lang="en-US" dirty="0"/>
-              <a:t> </a:t>
-            </a:r>
-            <a:r>
-              <a:rPr lang="en-US" dirty="0" err="1"/>
-              <a:t>egy</a:t>
-            </a:r>
-            <a:r>
-              <a:rPr lang="en-US" dirty="0"/>
-              <a:t> </a:t>
-            </a:r>
-            <a:r>
-              <a:rPr lang="en-US" dirty="0" err="1"/>
-              <a:t>soros</a:t>
-            </a:r>
-            <a:r>
-              <a:rPr lang="en-US" dirty="0"/>
-              <a:t> </a:t>
-            </a:r>
-            <a:r>
-              <a:rPr lang="en-US" dirty="0" err="1"/>
-              <a:t>lesz</a:t>
+              <a:rPr lang="en-US" dirty="0" err="1"/>
+              <a:t>Itt</a:t>
+            </a:r>
+            <a:r>
+              <a:rPr lang="en-US" dirty="0"/>
+              <a:t> </a:t>
+            </a:r>
+            <a:r>
+              <a:rPr lang="en-US" dirty="0" err="1"/>
+              <a:t>csak</a:t>
+            </a:r>
+            <a:r>
+              <a:rPr lang="en-US" dirty="0"/>
+              <a:t> </a:t>
+            </a:r>
+            <a:r>
+              <a:rPr lang="en-US" dirty="0" err="1"/>
+              <a:t>azért</a:t>
+            </a:r>
+            <a:r>
+              <a:rPr lang="en-US" dirty="0"/>
+              <a:t> </a:t>
+            </a:r>
+            <a:r>
+              <a:rPr lang="en-US" dirty="0" err="1"/>
+              <a:t>kapsz</a:t>
+            </a:r>
+            <a:r>
+              <a:rPr lang="en-US" dirty="0"/>
+              <a:t> </a:t>
+            </a:r>
+            <a:r>
+              <a:rPr lang="en-US" dirty="0" err="1"/>
+              <a:t>warningokat</a:t>
+            </a:r>
+            <a:r>
+              <a:rPr lang="en-US" dirty="0"/>
+              <a:t> </a:t>
+            </a:r>
+            <a:r>
+              <a:rPr lang="en-US" dirty="0" err="1"/>
+              <a:t>egyébként</a:t>
             </a:r>
             <a:r>
               <a:rPr lang="en-US" dirty="0"/>
@@ -25087,7 +25487,47 @@
             </a:r>
             <a:r>
               <a:rPr lang="en-US" dirty="0" err="1"/>
-              <a:t>használd</a:t>
+              <a:t>mert</a:t>
+            </a:r>
+            <a:r>
+              <a:rPr lang="en-US" dirty="0"/>
+              <a:t> </a:t>
+            </a:r>
+            <a:r>
+              <a:rPr lang="en-US" dirty="0" err="1"/>
+              <a:t>kézzel</a:t>
+            </a:r>
+            <a:r>
+              <a:rPr lang="en-US" dirty="0"/>
+              <a:t> </a:t>
+            </a:r>
+            <a:r>
+              <a:rPr lang="en-US" dirty="0" err="1"/>
+              <a:t>hívjuk</a:t>
+            </a:r>
+            <a:r>
+              <a:rPr lang="en-US" dirty="0"/>
+              <a:t> meg a Destroy </a:t>
+            </a:r>
+            <a:r>
+              <a:rPr lang="en-US" dirty="0" err="1"/>
+              <a:t>függvényt</a:t>
+            </a:r>
+            <a:r>
+              <a:rPr lang="en-US" dirty="0"/>
+              <a:t>, ha </a:t>
+            </a:r>
+            <a:r>
+              <a:rPr lang="en-US" dirty="0" err="1"/>
+              <a:t>hagynánk</a:t>
+            </a:r>
+            <a:r>
+              <a:rPr lang="en-US" dirty="0"/>
+              <a:t> a default </a:t>
+            </a:r>
+            <a:r>
+              <a:rPr lang="en-US" dirty="0" err="1"/>
+              <a:t>destruktorra</a:t>
             </a:r>
             <a:r>
               <a:rPr lang="en-US" dirty="0"/>
@@ -25095,56 +25535,103 @@
             </a:r>
             <a:r>
               <a:rPr lang="en-US" dirty="0" err="1"/>
-              <a:t>commandList</a:t>
-            </a:r>
-            <a:r>
-              <a:rPr lang="en-US" dirty="0"/>
-              <a:t>-&gt;</a:t>
-            </a:r>
-            <a:r>
-              <a:rPr lang="en-US" dirty="0" err="1"/>
-              <a:t>SetPipelineState</a:t>
-            </a:r>
-            <a:r>
-              <a:rPr lang="en-US" dirty="0"/>
-              <a:t>() </a:t>
-            </a:r>
-            <a:r>
-              <a:rPr lang="en-US" dirty="0" err="1"/>
-              <a:t>függvényt</a:t>
-            </a:r>
-            <a:r>
-              <a:rPr lang="en-US" dirty="0"/>
-              <a:t>.</a:t>
-            </a:r>
-          </a:p>
-          <a:p>
-            <a:endParaRPr lang="en-US" dirty="0"/>
-          </a:p>
-          <a:p>
-            <a:r>
-              <a:rPr lang="en-US" dirty="0"/>
-              <a:t>A (2.) </a:t>
-            </a:r>
-            <a:r>
-              <a:rPr lang="en-US" dirty="0" err="1"/>
-              <a:t>részfeladatnál</a:t>
-            </a:r>
-            <a:r>
-              <a:rPr lang="en-US" dirty="0"/>
-              <a:t> </a:t>
-            </a:r>
-            <a:r>
-              <a:rPr lang="en-US" dirty="0" err="1"/>
-              <a:t>ugyan</a:t>
-            </a:r>
-            <a:r>
-              <a:rPr lang="en-US" dirty="0"/>
-              <a:t> </a:t>
-            </a:r>
-            <a:r>
-              <a:rPr lang="en-US" dirty="0" err="1"/>
-              <a:t>azt</a:t>
+              <a:t>feladatot</a:t>
+            </a:r>
+            <a:r>
+              <a:rPr lang="en-US" dirty="0"/>
+              <a:t> </a:t>
+            </a:r>
+            <a:r>
+              <a:rPr lang="en-US" dirty="0" err="1"/>
+              <a:t>akkor</a:t>
+            </a:r>
+            <a:r>
+              <a:rPr lang="en-US" dirty="0"/>
+              <a:t> </a:t>
+            </a:r>
+            <a:r>
+              <a:rPr lang="en-US" dirty="0" err="1"/>
+              <a:t>nagy</a:t>
+            </a:r>
+            <a:r>
+              <a:rPr lang="en-US" dirty="0"/>
+              <a:t> </a:t>
+            </a:r>
+            <a:r>
+              <a:rPr lang="en-US" dirty="0" err="1"/>
+              <a:t>eséllyel</a:t>
+            </a:r>
+            <a:r>
+              <a:rPr lang="en-US" dirty="0"/>
+              <a:t> </a:t>
+            </a:r>
+            <a:r>
+              <a:rPr lang="en-US" dirty="0" err="1"/>
+              <a:t>minden</a:t>
+            </a:r>
+            <a:r>
+              <a:rPr lang="en-US" dirty="0"/>
+              <a:t> </a:t>
+            </a:r>
+            <a:r>
+              <a:rPr lang="en-US" dirty="0" err="1"/>
+              <a:t>jó</a:t>
+            </a:r>
+            <a:r>
+              <a:rPr lang="en-US" dirty="0"/>
+              <a:t> </a:t>
+            </a:r>
+            <a:r>
+              <a:rPr lang="en-US" dirty="0" err="1"/>
+              <a:t>sorrendben</a:t>
+            </a:r>
+            <a:r>
+              <a:rPr lang="en-US" dirty="0"/>
+              <a:t> </a:t>
+            </a:r>
+            <a:r>
+              <a:rPr lang="en-US" dirty="0" err="1"/>
+              <a:t>szabadulna</a:t>
+            </a:r>
+            <a:r>
+              <a:rPr lang="en-US" dirty="0"/>
+              <a:t> </a:t>
+            </a:r>
+            <a:r>
+              <a:rPr lang="en-US" dirty="0" err="1"/>
+              <a:t>fel</a:t>
+            </a:r>
+            <a:r>
+              <a:rPr lang="en-US" dirty="0"/>
+              <a:t>, a smart </a:t>
+            </a:r>
+            <a:r>
+              <a:rPr lang="en-US" dirty="0" err="1"/>
+              <a:t>pointereknek</a:t>
+            </a:r>
+            <a:r>
+              <a:rPr lang="en-US" dirty="0"/>
+              <a:t> </a:t>
+            </a:r>
+            <a:r>
+              <a:rPr lang="en-US" dirty="0" err="1"/>
+              <a:t>hála</a:t>
+            </a:r>
+            <a:r>
+              <a:rPr lang="en-US" dirty="0"/>
+              <a:t>. De </a:t>
+            </a:r>
+            <a:r>
+              <a:rPr lang="en-US" dirty="0" err="1"/>
+              <a:t>szeretnénk</a:t>
+            </a:r>
+            <a:r>
+              <a:rPr lang="en-US" dirty="0"/>
+              <a:t> </a:t>
+            </a:r>
+            <a:r>
+              <a:rPr lang="en-US" dirty="0" err="1"/>
+              <a:t>demonstrálni</a:t>
             </a:r>
             <a:r>
               <a:rPr lang="en-US" dirty="0"/>
@@ -25152,55 +25639,15 @@
             </a:r>
             <a:r>
               <a:rPr lang="en-US" dirty="0" err="1"/>
-              <a:t>VertexBufferView</a:t>
-            </a:r>
-            <a:r>
-              <a:rPr lang="en-US" dirty="0"/>
-              <a:t>-t </a:t>
-            </a:r>
-            <a:r>
-              <a:rPr lang="en-US" dirty="0" err="1"/>
-              <a:t>fogjuk</a:t>
-            </a:r>
-            <a:r>
-              <a:rPr lang="en-US" dirty="0"/>
-              <a:t> </a:t>
-            </a:r>
-            <a:r>
-              <a:rPr lang="en-US" dirty="0" err="1"/>
-              <a:t>átadni</a:t>
-            </a:r>
-            <a:r>
-              <a:rPr lang="en-US" dirty="0"/>
-              <a:t> </a:t>
-            </a:r>
-            <a:r>
-              <a:rPr lang="en-US" dirty="0" err="1"/>
-              <a:t>rajzolásnál</a:t>
-            </a:r>
-            <a:r>
-              <a:rPr lang="en-US" dirty="0"/>
-              <a:t>, </a:t>
-            </a:r>
-            <a:r>
-              <a:rPr lang="en-US" dirty="0" err="1"/>
-              <a:t>két</a:t>
-            </a:r>
-            <a:r>
-              <a:rPr lang="en-US" dirty="0"/>
-              <a:t> draw </a:t>
-            </a:r>
-            <a:r>
-              <a:rPr lang="en-US" dirty="0" err="1"/>
-              <a:t>hívás</a:t>
-            </a:r>
-            <a:r>
-              <a:rPr lang="en-US" dirty="0"/>
-              <a:t> </a:t>
-            </a:r>
-            <a:r>
-              <a:rPr lang="en-US" dirty="0" err="1"/>
-              <a:t>lesz</a:t>
+              <a:t>lehetséges</a:t>
+            </a:r>
+            <a:r>
+              <a:rPr lang="en-US" dirty="0"/>
+              <a:t> </a:t>
+            </a:r>
+            <a:r>
+              <a:rPr lang="en-US" dirty="0" err="1"/>
+              <a:t>hibákat</a:t>
             </a:r>
             <a:r>
               <a:rPr lang="en-US" dirty="0"/>
@@ -25212,27 +25659,27 @@
             </a:r>
             <a:r>
               <a:rPr lang="en-US" dirty="0"/>
-              <a:t> ha </a:t>
-            </a:r>
-            <a:r>
-              <a:rPr lang="en-US" dirty="0" err="1"/>
-              <a:t>ügyesen</a:t>
-            </a:r>
-            <a:r>
-              <a:rPr lang="en-US" dirty="0"/>
-              <a:t> </a:t>
-            </a:r>
-            <a:r>
-              <a:rPr lang="en-US" dirty="0" err="1"/>
-              <a:t>szervezed</a:t>
-            </a:r>
-            <a:r>
-              <a:rPr lang="en-US" dirty="0"/>
-              <a:t> </a:t>
-            </a:r>
-            <a:r>
-              <a:rPr lang="en-US" dirty="0" err="1"/>
-              <a:t>akkor</a:t>
+              <a:t> </a:t>
+            </a:r>
+            <a:r>
+              <a:rPr lang="en-US" dirty="0" err="1"/>
+              <a:t>azok</a:t>
+            </a:r>
+            <a:r>
+              <a:rPr lang="en-US" dirty="0"/>
+              <a:t> </a:t>
+            </a:r>
+            <a:r>
+              <a:rPr lang="en-US" dirty="0" err="1"/>
+              <a:t>elhárítását</a:t>
+            </a:r>
+            <a:r>
+              <a:rPr lang="en-US" dirty="0"/>
+              <a:t> </a:t>
+            </a:r>
+            <a:r>
+              <a:rPr lang="en-US" dirty="0" err="1"/>
+              <a:t>ezzel</a:t>
             </a:r>
             <a:r>
               <a:rPr lang="en-US" dirty="0"/>
@@ -25240,288 +25687,7 @@
             </a:r>
             <a:r>
               <a:rPr lang="en-US" dirty="0" err="1"/>
-              <a:t>commandList</a:t>
-            </a:r>
-            <a:r>
-              <a:rPr lang="en-US" dirty="0"/>
-              <a:t>-&gt;Reset(…) –</a:t>
-            </a:r>
-            <a:r>
-              <a:rPr lang="en-US" dirty="0" err="1"/>
-              <a:t>en</a:t>
-            </a:r>
-            <a:r>
-              <a:rPr lang="en-US" dirty="0"/>
-              <a:t> </a:t>
-            </a:r>
-            <a:r>
-              <a:rPr lang="en-US" dirty="0" err="1"/>
-              <a:t>kívül</a:t>
-            </a:r>
-            <a:r>
-              <a:rPr lang="en-US" dirty="0"/>
-              <a:t> </a:t>
-            </a:r>
-            <a:r>
-              <a:rPr lang="en-US" dirty="0" err="1"/>
-              <a:t>csak</a:t>
-            </a:r>
-            <a:r>
-              <a:rPr lang="en-US" dirty="0"/>
-              <a:t> </a:t>
-            </a:r>
-            <a:r>
-              <a:rPr lang="en-US" dirty="0" err="1"/>
-              <a:t>egy</a:t>
-            </a:r>
-            <a:r>
-              <a:rPr lang="en-US" dirty="0"/>
-              <a:t> </a:t>
-            </a:r>
-            <a:r>
-              <a:rPr lang="en-US" dirty="0" err="1"/>
-              <a:t>SetPipelineState</a:t>
-            </a:r>
-            <a:r>
-              <a:rPr lang="en-US" dirty="0"/>
-              <a:t> </a:t>
-            </a:r>
-            <a:r>
-              <a:rPr lang="en-US" dirty="0" err="1"/>
-              <a:t>kell</a:t>
-            </a:r>
-            <a:r>
-              <a:rPr lang="en-US" dirty="0"/>
-              <a:t>.</a:t>
-            </a:r>
-          </a:p>
-          <a:p>
-            <a:endParaRPr lang="en-US" dirty="0"/>
-          </a:p>
-          <a:p>
-            <a:r>
-              <a:rPr lang="en-US" dirty="0"/>
-              <a:t>(3.) </a:t>
-            </a:r>
-            <a:r>
-              <a:rPr lang="en-US" dirty="0" err="1"/>
-              <a:t>részfeladatnál</a:t>
-            </a:r>
-            <a:r>
-              <a:rPr lang="en-US" dirty="0"/>
-              <a:t> </a:t>
-            </a:r>
-            <a:r>
-              <a:rPr lang="en-US" dirty="0" err="1"/>
-              <a:t>írd</a:t>
-            </a:r>
-            <a:r>
-              <a:rPr lang="en-US" dirty="0"/>
-              <a:t> </a:t>
-            </a:r>
-            <a:r>
-              <a:rPr lang="en-US" dirty="0" err="1"/>
-              <a:t>át</a:t>
-            </a:r>
-            <a:r>
-              <a:rPr lang="en-US" dirty="0"/>
-              <a:t> </a:t>
-            </a:r>
-            <a:r>
-              <a:rPr lang="en-US" dirty="0" err="1"/>
-              <a:t>mindkét</a:t>
-            </a:r>
-            <a:r>
-              <a:rPr lang="en-US" dirty="0"/>
-              <a:t> </a:t>
-            </a:r>
-            <a:r>
-              <a:rPr lang="en-US" dirty="0" err="1"/>
-              <a:t>vertexshadert</a:t>
-            </a:r>
-            <a:r>
-              <a:rPr lang="en-US" dirty="0"/>
-              <a:t> </a:t>
-            </a:r>
-            <a:r>
-              <a:rPr lang="en-US" dirty="0" err="1"/>
-              <a:t>úgy</a:t>
-            </a:r>
-            <a:r>
-              <a:rPr lang="en-US" dirty="0"/>
-              <a:t>, </a:t>
-            </a:r>
-            <a:r>
-              <a:rPr lang="en-US" dirty="0" err="1"/>
-              <a:t>hogy</a:t>
-            </a:r>
-            <a:r>
-              <a:rPr lang="en-US" dirty="0"/>
-              <a:t> </a:t>
-            </a:r>
-            <a:r>
-              <a:rPr lang="en-US" dirty="0" err="1"/>
-              <a:t>az</a:t>
-            </a:r>
-            <a:r>
-              <a:rPr lang="en-US" dirty="0"/>
-              <a:t> </a:t>
-            </a:r>
-            <a:r>
-              <a:rPr lang="en-US" dirty="0" err="1"/>
-              <a:t>egyik</a:t>
-            </a:r>
-            <a:r>
-              <a:rPr lang="en-US" dirty="0"/>
-              <a:t> </a:t>
-            </a:r>
-            <a:r>
-              <a:rPr lang="en-US" dirty="0" err="1"/>
-              <a:t>háromszög</a:t>
-            </a:r>
-            <a:r>
-              <a:rPr lang="en-US" dirty="0"/>
-              <a:t> </a:t>
-            </a:r>
-            <a:r>
-              <a:rPr lang="en-US" dirty="0" err="1"/>
-              <a:t>kerüljön</a:t>
-            </a:r>
-            <a:r>
-              <a:rPr lang="en-US" dirty="0"/>
-              <a:t> </a:t>
-            </a:r>
-            <a:r>
-              <a:rPr lang="en-US" dirty="0" err="1"/>
-              <a:t>az</a:t>
-            </a:r>
-            <a:r>
-              <a:rPr lang="en-US" dirty="0"/>
-              <a:t> X </a:t>
-            </a:r>
-            <a:r>
-              <a:rPr lang="el-GR" dirty="0"/>
-              <a:t>ϵ</a:t>
-            </a:r>
-            <a:r>
-              <a:rPr lang="en-US" dirty="0"/>
-              <a:t> [-1, 0] </a:t>
-            </a:r>
-            <a:r>
-              <a:rPr lang="en-US" dirty="0" err="1"/>
-              <a:t>részre</a:t>
-            </a:r>
-            <a:r>
-              <a:rPr lang="en-US" dirty="0"/>
-              <a:t>, a </a:t>
-            </a:r>
-            <a:r>
-              <a:rPr lang="en-US" dirty="0" err="1"/>
-              <a:t>másik</a:t>
-            </a:r>
-            <a:r>
-              <a:rPr lang="en-US" dirty="0"/>
-              <a:t> </a:t>
-            </a:r>
-            <a:r>
-              <a:rPr lang="en-US" dirty="0" err="1"/>
-              <a:t>háromszög</a:t>
-            </a:r>
-            <a:r>
-              <a:rPr lang="en-US" dirty="0"/>
-              <a:t> </a:t>
-            </a:r>
-            <a:r>
-              <a:rPr lang="en-US" dirty="0" err="1"/>
-              <a:t>pedig</a:t>
-            </a:r>
-            <a:r>
-              <a:rPr lang="en-US" dirty="0"/>
-              <a:t> </a:t>
-            </a:r>
-            <a:r>
-              <a:rPr lang="en-US" dirty="0" err="1"/>
-              <a:t>az</a:t>
-            </a:r>
-            <a:r>
-              <a:rPr lang="en-US" dirty="0"/>
-              <a:t> X </a:t>
-            </a:r>
-            <a:r>
-              <a:rPr lang="el-GR" dirty="0"/>
-              <a:t>ϵ</a:t>
-            </a:r>
-            <a:r>
-              <a:rPr lang="en-US" dirty="0"/>
-              <a:t> [0, 1] </a:t>
-            </a:r>
-            <a:r>
-              <a:rPr lang="en-US" dirty="0" err="1"/>
-              <a:t>részre</a:t>
-            </a:r>
-            <a:r>
-              <a:rPr lang="en-US" dirty="0"/>
-              <a:t>, Y </a:t>
-            </a:r>
-            <a:r>
-              <a:rPr lang="en-US" dirty="0" err="1"/>
-              <a:t>maradhat</a:t>
-            </a:r>
-            <a:r>
-              <a:rPr lang="en-US" dirty="0"/>
-              <a:t> de ha </a:t>
-            </a:r>
-            <a:r>
-              <a:rPr lang="en-US" dirty="0" err="1"/>
-              <a:t>nagyon</a:t>
-            </a:r>
-            <a:r>
-              <a:rPr lang="en-US" dirty="0"/>
-              <a:t> </a:t>
-            </a:r>
-            <a:r>
-              <a:rPr lang="en-US" dirty="0" err="1"/>
-              <a:t>csúnyának</a:t>
-            </a:r>
-            <a:r>
-              <a:rPr lang="en-US" dirty="0"/>
-              <a:t> </a:t>
-            </a:r>
-            <a:r>
-              <a:rPr lang="en-US" dirty="0" err="1"/>
-              <a:t>érzed</a:t>
-            </a:r>
-            <a:r>
-              <a:rPr lang="en-US" dirty="0"/>
-              <a:t> </a:t>
-            </a:r>
-            <a:r>
-              <a:rPr lang="en-US" dirty="0" err="1"/>
-              <a:t>akkor</a:t>
-            </a:r>
-            <a:r>
-              <a:rPr lang="en-US" dirty="0"/>
-              <a:t> </a:t>
-            </a:r>
-            <a:r>
-              <a:rPr lang="en-US" dirty="0" err="1"/>
-              <a:t>nyugodtan</a:t>
-            </a:r>
-            <a:r>
-              <a:rPr lang="en-US" dirty="0"/>
-              <a:t> </a:t>
-            </a:r>
-            <a:r>
-              <a:rPr lang="en-US" dirty="0" err="1"/>
-              <a:t>változtasd</a:t>
-            </a:r>
-            <a:r>
-              <a:rPr lang="en-US" dirty="0"/>
-              <a:t> meg </a:t>
-            </a:r>
-            <a:r>
-              <a:rPr lang="en-US" dirty="0" err="1"/>
-              <a:t>kedvedre</a:t>
+              <a:t>feladattal</a:t>
             </a:r>
             <a:r>
               <a:rPr lang="en-US" dirty="0"/>
@@ -25549,6 +25715,288 @@
               <a:rPr lang="en-US" smtClean="0"/>
               <a:pPr/>
               <a:t>59</a:t>
+            </a:fld>
+            <a:endParaRPr lang="en-US"/>
+          </a:p>
+        </p:txBody>
+      </p:sp>
+    </p:spTree>
+    <p:extLst>
+      <p:ext uri="{BB962C8B-B14F-4D97-AF65-F5344CB8AC3E}">
+        <p14:creationId xmlns:p14="http://schemas.microsoft.com/office/powerpoint/2010/main" val="1583976225"/>
+      </p:ext>
+    </p:extLst>
+  </p:cSld>
+  <p:clrMapOvr>
+    <a:masterClrMapping/>
+  </p:clrMapOvr>
+</p:notes>
+</file>
+
+<file path=ppt/notesSlides/notesSlide51.xml><?xml version="1.0" encoding="utf-8"?>
+<p:notes xmlns:a="http://schemas.openxmlformats.org/drawingml/2006/main" xmlns:r="http://schemas.openxmlformats.org/officeDocument/2006/relationships" xmlns:p="http://schemas.openxmlformats.org/presentationml/2006/main">
+  <p:cSld>
+    <p:spTree>
+      <p:nvGrpSpPr>
+        <p:cNvPr id="1" name=""/>
+        <p:cNvGrpSpPr/>
+        <p:nvPr/>
+      </p:nvGrpSpPr>
+      <p:grpSpPr>
+        <a:xfrm>
+          <a:off x="0" y="0"/>
+          <a:ext cx="0" cy="0"/>
+          <a:chOff x="0" y="0"/>
+          <a:chExt cx="0" cy="0"/>
+        </a:xfrm>
+      </p:grpSpPr>
+      <p:sp>
+        <p:nvSpPr>
+          <p:cNvPr id="2" name="Slide Image Placeholder 1"/>
+          <p:cNvSpPr>
+            <a:spLocks noGrp="1" noRot="1" noChangeAspect="1"/>
+          </p:cNvSpPr>
+          <p:nvPr>
+            <p:ph type="sldImg"/>
+          </p:nvPr>
+        </p:nvSpPr>
+        <p:spPr/>
+      </p:sp>
+      <p:sp>
+        <p:nvSpPr>
+          <p:cNvPr id="3" name="Notes Placeholder 2"/>
+          <p:cNvSpPr>
+            <a:spLocks noGrp="1"/>
+          </p:cNvSpPr>
+          <p:nvPr>
+            <p:ph type="body" idx="1"/>
+          </p:nvPr>
+        </p:nvSpPr>
+        <p:spPr/>
+        <p:txBody>
+          <a:bodyPr>
+            <a:normAutofit/>
+          </a:bodyPr>
+          <a:lstStyle/>
+          <a:p>
+            <a:r>
+              <a:rPr lang="en-US" dirty="0"/>
+              <a:t>A </a:t>
+            </a:r>
+            <a:r>
+              <a:rPr lang="en-US" dirty="0" err="1"/>
+              <a:t>színátmenetet</a:t>
+            </a:r>
+            <a:r>
+              <a:rPr lang="en-US" dirty="0"/>
+              <a:t> </a:t>
+            </a:r>
+            <a:r>
+              <a:rPr lang="en-US" dirty="0" err="1"/>
+              <a:t>azért</a:t>
+            </a:r>
+            <a:r>
+              <a:rPr lang="en-US" dirty="0"/>
+              <a:t> </a:t>
+            </a:r>
+            <a:r>
+              <a:rPr lang="en-US" dirty="0" err="1"/>
+              <a:t>kapjuk</a:t>
+            </a:r>
+            <a:r>
+              <a:rPr lang="en-US" dirty="0"/>
+              <a:t>, </a:t>
+            </a:r>
+            <a:r>
+              <a:rPr lang="en-US" dirty="0" err="1"/>
+              <a:t>mert</a:t>
+            </a:r>
+            <a:r>
+              <a:rPr lang="en-US" dirty="0"/>
+              <a:t> a </a:t>
+            </a:r>
+            <a:r>
+              <a:rPr lang="en-US" dirty="0" err="1"/>
+              <a:t>felső</a:t>
+            </a:r>
+            <a:r>
+              <a:rPr lang="en-US" dirty="0"/>
+              <a:t> </a:t>
+            </a:r>
+            <a:r>
+              <a:rPr lang="en-US" dirty="0" err="1"/>
+              <a:t>csúcsból</a:t>
+            </a:r>
+            <a:r>
+              <a:rPr lang="en-US" dirty="0"/>
+              <a:t> </a:t>
+            </a:r>
+            <a:r>
+              <a:rPr lang="en-US" dirty="0" err="1"/>
+              <a:t>lineárisan</a:t>
+            </a:r>
+            <a:r>
+              <a:rPr lang="en-US" dirty="0"/>
+              <a:t> </a:t>
+            </a:r>
+            <a:r>
+              <a:rPr lang="en-US" dirty="0" err="1"/>
+              <a:t>interpolál</a:t>
+            </a:r>
+            <a:r>
+              <a:rPr lang="en-US" dirty="0"/>
+              <a:t> a pixel shader (</a:t>
+            </a:r>
+            <a:r>
+              <a:rPr lang="en-US" dirty="0" err="1"/>
+              <a:t>vagyis</a:t>
+            </a:r>
+            <a:r>
+              <a:rPr lang="en-US" dirty="0"/>
+              <a:t> a pixel shader </a:t>
+            </a:r>
+            <a:r>
+              <a:rPr lang="en-US" dirty="0" err="1"/>
+              <a:t>már</a:t>
+            </a:r>
+            <a:r>
+              <a:rPr lang="en-US" dirty="0"/>
+              <a:t> </a:t>
+            </a:r>
+            <a:r>
+              <a:rPr lang="en-US" dirty="0" err="1"/>
+              <a:t>az</a:t>
+            </a:r>
+            <a:r>
+              <a:rPr lang="en-US" dirty="0"/>
+              <a:t> </a:t>
+            </a:r>
+            <a:r>
+              <a:rPr lang="en-US" dirty="0" err="1"/>
+              <a:t>interpolált</a:t>
+            </a:r>
+            <a:r>
+              <a:rPr lang="en-US" dirty="0"/>
+              <a:t> </a:t>
+            </a:r>
+            <a:r>
+              <a:rPr lang="en-US" dirty="0" err="1"/>
+              <a:t>értékeket</a:t>
+            </a:r>
+            <a:r>
+              <a:rPr lang="en-US" dirty="0"/>
+              <a:t> </a:t>
+            </a:r>
+            <a:r>
+              <a:rPr lang="en-US" dirty="0" err="1"/>
+              <a:t>kapja</a:t>
+            </a:r>
+            <a:r>
+              <a:rPr lang="en-US" dirty="0"/>
+              <a:t> a </a:t>
+            </a:r>
+            <a:r>
+              <a:rPr lang="en-US" dirty="0" err="1"/>
+              <a:t>rasterizertől</a:t>
+            </a:r>
+            <a:r>
+              <a:rPr lang="en-US" dirty="0"/>
+              <a:t>), </a:t>
+            </a:r>
+            <a:r>
+              <a:rPr lang="en-US" dirty="0" err="1"/>
+              <a:t>tehát</a:t>
+            </a:r>
+            <a:r>
+              <a:rPr lang="en-US" dirty="0"/>
+              <a:t> </a:t>
+            </a:r>
+            <a:r>
+              <a:rPr lang="en-US" dirty="0" err="1"/>
+              <a:t>egy</a:t>
+            </a:r>
+            <a:r>
+              <a:rPr lang="en-US" dirty="0"/>
+              <a:t> </a:t>
+            </a:r>
+            <a:r>
+              <a:rPr lang="en-US" dirty="0" err="1"/>
+              <a:t>másik</a:t>
+            </a:r>
+            <a:r>
+              <a:rPr lang="en-US" dirty="0"/>
+              <a:t> </a:t>
+            </a:r>
+            <a:r>
+              <a:rPr lang="en-US" dirty="0" err="1"/>
+              <a:t>csúcsba</a:t>
+            </a:r>
+            <a:r>
+              <a:rPr lang="en-US" dirty="0"/>
+              <a:t>, </a:t>
+            </a:r>
+            <a:r>
+              <a:rPr lang="en-US" dirty="0" err="1"/>
+              <a:t>tehát</a:t>
+            </a:r>
+            <a:r>
+              <a:rPr lang="en-US" dirty="0"/>
+              <a:t> </a:t>
+            </a:r>
+            <a:r>
+              <a:rPr lang="en-US" dirty="0" err="1"/>
+              <a:t>pirosból</a:t>
+            </a:r>
+            <a:r>
+              <a:rPr lang="en-US" dirty="0"/>
+              <a:t> </a:t>
+            </a:r>
+            <a:r>
+              <a:rPr lang="en-US" dirty="0" err="1"/>
+              <a:t>csinál</a:t>
+            </a:r>
+            <a:r>
+              <a:rPr lang="en-US" dirty="0"/>
+              <a:t> </a:t>
+            </a:r>
+            <a:r>
+              <a:rPr lang="en-US" dirty="0" err="1"/>
+              <a:t>zöldet</a:t>
+            </a:r>
+            <a:r>
+              <a:rPr lang="en-US" dirty="0"/>
+              <a:t> </a:t>
+            </a:r>
+            <a:r>
+              <a:rPr lang="en-US" dirty="0" err="1"/>
+              <a:t>stb</a:t>
+            </a:r>
+            <a:r>
+              <a:rPr lang="en-US" dirty="0"/>
+              <a:t>…</a:t>
+            </a:r>
+          </a:p>
+        </p:txBody>
+      </p:sp>
+      <p:sp>
+        <p:nvSpPr>
+          <p:cNvPr id="4" name="Slide Number Placeholder 3"/>
+          <p:cNvSpPr>
+            <a:spLocks noGrp="1"/>
+          </p:cNvSpPr>
+          <p:nvPr>
+            <p:ph type="sldNum" sz="quarter" idx="5"/>
+          </p:nvPr>
+        </p:nvSpPr>
+        <p:spPr/>
+        <p:txBody>
+          <a:bodyPr/>
+          <a:lstStyle/>
+          <a:p>
+            <a:fld id="{EE1CB54F-71BB-491D-A98F-DF04FDAAD72D}" type="slidenum">
+              <a:rPr lang="en-US" smtClean="0"/>
+              <a:pPr/>
+              <a:t>60</a:t>
             </a:fld>
             <a:endParaRPr lang="en-US"/>
           </a:p>
@@ -40551,7 +40999,19 @@
             </a:r>
             <a:r>
               <a:rPr lang="en-US" dirty="0"/>
-              <a:t> ne a </a:t>
+              <a:t> </a:t>
+            </a:r>
+            <a:r>
+              <a:rPr lang="en-US" b="1" dirty="0">
+                <a:solidFill>
+                  <a:srgbClr val="FF0000"/>
+                </a:solidFill>
+              </a:rPr>
+              <a:t>NE</a:t>
+            </a:r>
+            <a:r>
+              <a:rPr lang="en-US" dirty="0"/>
+              <a:t> a </a:t>
             </a:r>
             <a:r>
               <a:rPr lang="en-US" dirty="0" err="1"/>
@@ -41229,25 +41689,244 @@
           <a:lstStyle/>
           <a:p>
             <a:r>
-              <a:rPr lang="en-US" dirty="0"/>
-              <a:t>Az </a:t>
-            </a:r>
-            <a:r>
-              <a:rPr lang="en-US" dirty="0" err="1"/>
-              <a:t>eredmény</a:t>
-            </a:r>
-            <a:r>
-              <a:rPr lang="en-US"/>
-              <a:t> - 2</a:t>
-            </a:r>
-            <a:endParaRPr lang="en-US" dirty="0"/>
+              <a:rPr lang="en-US" dirty="0" err="1"/>
+              <a:t>Gyakorló</a:t>
+            </a:r>
+            <a:r>
+              <a:rPr lang="en-US" dirty="0"/>
+              <a:t> </a:t>
+            </a:r>
+            <a:r>
+              <a:rPr lang="en-US" dirty="0" err="1"/>
+              <a:t>Feladatok</a:t>
+            </a:r>
+            <a:r>
+              <a:rPr lang="en-US" dirty="0"/>
+              <a:t> – </a:t>
+            </a:r>
+            <a:r>
+              <a:rPr lang="en-US" dirty="0" err="1"/>
+              <a:t>Tisztítás</a:t>
+            </a:r>
+            <a:r>
+              <a:rPr lang="en-US" dirty="0"/>
+              <a:t> </a:t>
+            </a:r>
+          </a:p>
+        </p:txBody>
+      </p:sp>
+      <p:sp>
+        <p:nvSpPr>
+          <p:cNvPr id="4" name="Tartalom helye 2">
+            <a:extLst>
+              <a:ext uri="{FF2B5EF4-FFF2-40B4-BE49-F238E27FC236}">
+                <a16:creationId xmlns:a16="http://schemas.microsoft.com/office/drawing/2014/main" id="{F18F4073-86F8-4B26-A949-D13C83E85303}"/>
+              </a:ext>
+            </a:extLst>
+          </p:cNvPr>
+          <p:cNvSpPr>
+            <a:spLocks noGrp="1"/>
+          </p:cNvSpPr>
+          <p:nvPr>
+            <p:ph idx="1"/>
+          </p:nvPr>
+        </p:nvSpPr>
+        <p:spPr>
+          <a:xfrm>
+            <a:off x="457200" y="1600200"/>
+            <a:ext cx="8229600" cy="5105400"/>
+          </a:xfrm>
+        </p:spPr>
+        <p:txBody>
+          <a:bodyPr>
+            <a:normAutofit/>
+          </a:bodyPr>
+          <a:lstStyle/>
+          <a:p>
+            <a:pPr marL="0" indent="0">
+              <a:buNone/>
+            </a:pPr>
+            <a:r>
+              <a:rPr lang="en-US" dirty="0" err="1"/>
+              <a:t>Nézd</a:t>
+            </a:r>
+            <a:r>
+              <a:rPr lang="en-US" dirty="0"/>
+              <a:t> </a:t>
+            </a:r>
+            <a:r>
+              <a:rPr lang="en-US" dirty="0" err="1"/>
+              <a:t>az</a:t>
+            </a:r>
+            <a:r>
+              <a:rPr lang="en-US" dirty="0"/>
+              <a:t> output </a:t>
+            </a:r>
+            <a:r>
+              <a:rPr lang="en-US" dirty="0" err="1"/>
+              <a:t>ablakot</a:t>
+            </a:r>
+            <a:r>
+              <a:rPr lang="en-US" dirty="0"/>
+              <a:t> </a:t>
+            </a:r>
+            <a:r>
+              <a:rPr lang="en-US" dirty="0" err="1"/>
+              <a:t>amikor</a:t>
+            </a:r>
+            <a:r>
+              <a:rPr lang="en-US" dirty="0"/>
+              <a:t> </a:t>
+            </a:r>
+            <a:r>
+              <a:rPr lang="en-US" dirty="0" err="1"/>
+              <a:t>bezárod</a:t>
+            </a:r>
+            <a:r>
+              <a:rPr lang="en-US" dirty="0"/>
+              <a:t> a </a:t>
+            </a:r>
+            <a:r>
+              <a:rPr lang="en-US" dirty="0" err="1"/>
+              <a:t>programodat</a:t>
+            </a:r>
+            <a:r>
+              <a:rPr lang="en-US" dirty="0"/>
+              <a:t>, </a:t>
+            </a:r>
+            <a:r>
+              <a:rPr lang="en-US" dirty="0" err="1"/>
+              <a:t>látsz</a:t>
+            </a:r>
+            <a:r>
+              <a:rPr lang="en-US" dirty="0"/>
+              <a:t> </a:t>
+            </a:r>
+            <a:r>
+              <a:rPr lang="en-US" dirty="0" err="1"/>
+              <a:t>egy</a:t>
+            </a:r>
+            <a:r>
+              <a:rPr lang="en-US" dirty="0"/>
+              <a:t> </a:t>
+            </a:r>
+            <a:r>
+              <a:rPr lang="en-US" dirty="0" err="1"/>
+              <a:t>csomó</a:t>
+            </a:r>
+            <a:r>
+              <a:rPr lang="en-US" dirty="0"/>
+              <a:t> D3D12 WARNING </a:t>
+            </a:r>
+            <a:r>
+              <a:rPr lang="en-US" dirty="0" err="1"/>
+              <a:t>üzenetet</a:t>
+            </a:r>
+            <a:r>
+              <a:rPr lang="en-US" dirty="0"/>
+              <a:t>. </a:t>
+            </a:r>
+          </a:p>
+          <a:p>
+            <a:pPr marL="514350" indent="-514350">
+              <a:buFont typeface="+mj-lt"/>
+              <a:buAutoNum type="arabicPeriod" startAt="9"/>
+            </a:pPr>
+            <a:r>
+              <a:rPr lang="en-US" dirty="0" err="1"/>
+              <a:t>Bővítsd</a:t>
+            </a:r>
+            <a:r>
+              <a:rPr lang="en-US" dirty="0"/>
+              <a:t> </a:t>
+            </a:r>
+            <a:r>
+              <a:rPr lang="en-US" dirty="0" err="1"/>
+              <a:t>ki</a:t>
+            </a:r>
+            <a:r>
+              <a:rPr lang="en-US" dirty="0"/>
+              <a:t> a </a:t>
+            </a:r>
+            <a:r>
+              <a:rPr lang="en-US" dirty="0" err="1"/>
+              <a:t>ReleaseResources</a:t>
+            </a:r>
+            <a:r>
+              <a:rPr lang="en-US" dirty="0"/>
+              <a:t>() </a:t>
+            </a:r>
+            <a:r>
+              <a:rPr lang="en-US" dirty="0" err="1"/>
+              <a:t>függvényt</a:t>
+            </a:r>
+            <a:r>
+              <a:rPr lang="en-US" dirty="0"/>
+              <a:t> </a:t>
+            </a:r>
+            <a:r>
+              <a:rPr lang="en-US" dirty="0" err="1"/>
+              <a:t>úgy</a:t>
+            </a:r>
+            <a:r>
+              <a:rPr lang="en-US" dirty="0"/>
+              <a:t>, </a:t>
+            </a:r>
+            <a:r>
+              <a:rPr lang="en-US" dirty="0" err="1"/>
+              <a:t>hogy</a:t>
+            </a:r>
+            <a:r>
+              <a:rPr lang="en-US" dirty="0"/>
+              <a:t> </a:t>
+            </a:r>
+            <a:r>
+              <a:rPr lang="en-US" dirty="0" err="1"/>
+              <a:t>az</a:t>
+            </a:r>
+            <a:r>
+              <a:rPr lang="en-US" dirty="0"/>
+              <a:t> </a:t>
+            </a:r>
+            <a:r>
+              <a:rPr lang="en-US" dirty="0" err="1"/>
+              <a:t>általad</a:t>
+            </a:r>
+            <a:r>
+              <a:rPr lang="en-US" dirty="0"/>
+              <a:t> </a:t>
+            </a:r>
+            <a:r>
+              <a:rPr lang="en-US" dirty="0" err="1"/>
+              <a:t>foglalt</a:t>
+            </a:r>
+            <a:r>
+              <a:rPr lang="en-US" dirty="0"/>
+              <a:t> </a:t>
+            </a:r>
+            <a:r>
+              <a:rPr lang="en-US" dirty="0" err="1"/>
+              <a:t>erőforrásokat</a:t>
+            </a:r>
+            <a:r>
+              <a:rPr lang="en-US" dirty="0"/>
+              <a:t> </a:t>
+            </a:r>
+            <a:r>
+              <a:rPr lang="en-US" dirty="0" err="1"/>
+              <a:t>felszabadítsa</a:t>
+            </a:r>
+            <a:r>
+              <a:rPr lang="en-US" dirty="0"/>
+              <a:t>.</a:t>
+            </a:r>
           </a:p>
         </p:txBody>
       </p:sp>
     </p:spTree>
     <p:extLst>
       <p:ext uri="{BB962C8B-B14F-4D97-AF65-F5344CB8AC3E}">
-        <p14:creationId xmlns:p14="http://schemas.microsoft.com/office/powerpoint/2010/main" val="2747443551"/>
+        <p14:creationId xmlns:p14="http://schemas.microsoft.com/office/powerpoint/2010/main" val="917294796"/>
       </p:ext>
     </p:extLst>
   </p:cSld>
@@ -41582,257 +42261,56 @@
           <a:p>
             <a:r>
               <a:rPr lang="en-US" dirty="0"/>
-              <a:t>Minta.cpp</a:t>
-            </a:r>
+              <a:t>Az </a:t>
+            </a:r>
+            <a:r>
+              <a:rPr lang="en-US" dirty="0" err="1"/>
+              <a:t>eredmény</a:t>
+            </a:r>
+            <a:r>
+              <a:rPr lang="en-US"/>
+              <a:t> - 2</a:t>
+            </a:r>
+            <a:endParaRPr lang="en-US" dirty="0"/>
           </a:p>
         </p:txBody>
       </p:sp>
-      <p:sp>
-        <p:nvSpPr>
-          <p:cNvPr id="3" name="Szöveg helye 2"/>
-          <p:cNvSpPr>
-            <a:spLocks noGrp="1"/>
-          </p:cNvSpPr>
-          <p:nvPr>
-            <p:ph type="body" sz="quarter" idx="13"/>
-          </p:nvPr>
-        </p:nvSpPr>
-        <p:spPr/>
-        <p:txBody>
-          <a:bodyPr>
-            <a:normAutofit/>
-          </a:bodyPr>
-          <a:lstStyle/>
-          <a:p>
-            <a:r>
-              <a:rPr lang="en-US" sz="2800" dirty="0" err="1"/>
-              <a:t>ComPtr</a:t>
-            </a:r>
-            <a:r>
-              <a:rPr lang="en-US" sz="2800" dirty="0"/>
-              <a:t>&lt;ID3DBlob&gt; </a:t>
-            </a:r>
-            <a:r>
-              <a:rPr lang="en-US" sz="2800" dirty="0" err="1"/>
-              <a:t>vertexShaderByteCode</a:t>
-            </a:r>
-            <a:r>
-              <a:rPr lang="en-US" sz="2800" dirty="0"/>
-              <a:t> = </a:t>
-            </a:r>
-            <a:r>
-              <a:rPr lang="en-US" sz="2800" dirty="0" err="1"/>
-              <a:t>loadShaderCode</a:t>
-            </a:r>
-            <a:r>
-              <a:rPr lang="en-US" sz="2800" dirty="0"/>
-              <a:t>("</a:t>
-            </a:r>
-            <a:r>
-              <a:rPr lang="en-US" sz="2800" dirty="0" err="1"/>
-              <a:t>vs</a:t>
-            </a:r>
-            <a:r>
-              <a:rPr lang="en-US" sz="2800" strike="sngStrike" dirty="0" err="1">
-                <a:solidFill>
-                  <a:srgbClr val="FF0000"/>
-                </a:solidFill>
-              </a:rPr>
-              <a:t>Idle</a:t>
-            </a:r>
-            <a:r>
-              <a:rPr lang="en-US" sz="2800" dirty="0" err="1">
-                <a:solidFill>
-                  <a:srgbClr val="0070C0"/>
-                </a:solidFill>
-              </a:rPr>
-              <a:t>Trafo</a:t>
-            </a:r>
-            <a:r>
-              <a:rPr lang="en-US" sz="2800" dirty="0" err="1"/>
-              <a:t>.cso</a:t>
-            </a:r>
-            <a:r>
-              <a:rPr lang="en-US" sz="2800" dirty="0"/>
-              <a:t>");</a:t>
-            </a:r>
-          </a:p>
-          <a:p>
-            <a:endParaRPr lang="en-US" sz="2800" dirty="0"/>
-          </a:p>
-          <a:p>
-            <a:endParaRPr lang="en-US" sz="2800" dirty="0"/>
-          </a:p>
-          <a:p>
-            <a:endParaRPr lang="en-US" sz="2800" dirty="0"/>
-          </a:p>
-        </p:txBody>
-      </p:sp>
-    </p:spTree>
-    <p:extLst>
-      <p:ext uri="{BB962C8B-B14F-4D97-AF65-F5344CB8AC3E}">
-        <p14:creationId xmlns:p14="http://schemas.microsoft.com/office/powerpoint/2010/main" val="383087059"/>
-      </p:ext>
-    </p:extLst>
-  </p:cSld>
-  <p:clrMapOvr>
-    <a:masterClrMapping/>
-  </p:clrMapOvr>
-</p:sld>
-</file>
-
-<file path=ppt/slides/slide61.xml><?xml version="1.0" encoding="utf-8"?>
-<p:sld xmlns:a="http://schemas.openxmlformats.org/drawingml/2006/main" xmlns:r="http://schemas.openxmlformats.org/officeDocument/2006/relationships" xmlns:p="http://schemas.openxmlformats.org/presentationml/2006/main">
-  <p:cSld>
-    <p:spTree>
-      <p:nvGrpSpPr>
-        <p:cNvPr id="1" name=""/>
-        <p:cNvGrpSpPr/>
-        <p:nvPr/>
-      </p:nvGrpSpPr>
-      <p:grpSpPr>
-        <a:xfrm>
-          <a:off x="0" y="0"/>
-          <a:ext cx="0" cy="0"/>
-          <a:chOff x="0" y="0"/>
-          <a:chExt cx="0" cy="0"/>
-        </a:xfrm>
-      </p:grpSpPr>
-      <p:sp>
-        <p:nvSpPr>
-          <p:cNvPr id="2" name="Cím 1"/>
-          <p:cNvSpPr>
-            <a:spLocks noGrp="1"/>
-          </p:cNvSpPr>
-          <p:nvPr>
-            <p:ph type="title"/>
-          </p:nvPr>
-        </p:nvSpPr>
-        <p:spPr/>
-        <p:txBody>
-          <a:bodyPr/>
-          <a:lstStyle/>
-          <a:p>
-            <a:r>
-              <a:rPr lang="en-US" dirty="0" err="1"/>
-              <a:t>Minta.hlsl</a:t>
-            </a:r>
-            <a:endParaRPr lang="en-US" dirty="0"/>
-          </a:p>
-        </p:txBody>
-      </p:sp>
-      <p:sp>
-        <p:nvSpPr>
-          <p:cNvPr id="3" name="Szöveg helye 2"/>
-          <p:cNvSpPr>
-            <a:spLocks noGrp="1"/>
-          </p:cNvSpPr>
-          <p:nvPr>
-            <p:ph type="body" sz="quarter" idx="13"/>
-          </p:nvPr>
-        </p:nvSpPr>
-        <p:spPr>
-          <a:solidFill>
-            <a:srgbClr val="FFFF66"/>
-          </a:solidFill>
-        </p:spPr>
-        <p:txBody>
-          <a:bodyPr>
-            <a:normAutofit/>
-          </a:bodyPr>
-          <a:lstStyle/>
-          <a:p>
-            <a:r>
-              <a:rPr lang="en-US" sz="2800" noProof="1"/>
-              <a:t>cbuffer perObject{</a:t>
-            </a:r>
-          </a:p>
-          <a:p>
-            <a:r>
-              <a:rPr lang="en-US" sz="2800" noProof="1"/>
-              <a:t>  float4x4 modelMatrix;</a:t>
-            </a:r>
-          </a:p>
-          <a:p>
-            <a:r>
-              <a:rPr lang="en-US" sz="2800" noProof="1"/>
-              <a:t>  float4x4 modelMatrixInverse;</a:t>
-            </a:r>
-          </a:p>
-          <a:p>
-            <a:r>
-              <a:rPr lang="en-US" sz="2800" noProof="1"/>
-              <a:t>  float4x4 modelViewProjMatrix;</a:t>
-            </a:r>
-          </a:p>
-          <a:p>
-            <a:r>
-              <a:rPr lang="en-US" sz="2800" noProof="1"/>
-              <a:t>};</a:t>
-            </a:r>
-          </a:p>
-          <a:p>
-            <a:endParaRPr lang="en-US" sz="2800" noProof="1"/>
-          </a:p>
-        </p:txBody>
-      </p:sp>
-      <p:sp>
-        <p:nvSpPr>
-          <p:cNvPr id="4" name="Téglalap 3"/>
-          <p:cNvSpPr/>
+      <p:pic>
+        <p:nvPicPr>
+          <p:cNvPr id="3" name="Picture 2">
+            <a:extLst>
+              <a:ext uri="{FF2B5EF4-FFF2-40B4-BE49-F238E27FC236}">
+                <a16:creationId xmlns:a16="http://schemas.microsoft.com/office/drawing/2014/main" id="{E23D4089-15FD-4968-AD0A-915772DF653F}"/>
+              </a:ext>
+            </a:extLst>
+          </p:cNvPr>
+          <p:cNvPicPr>
+            <a:picLocks noChangeAspect="1"/>
+          </p:cNvPicPr>
           <p:nvPr/>
-        </p:nvSpPr>
+        </p:nvPicPr>
+        <p:blipFill>
+          <a:blip r:embed="rId3"/>
+          <a:stretch>
+            <a:fillRect/>
+          </a:stretch>
+        </p:blipFill>
         <p:spPr>
           <a:xfrm>
-            <a:off x="7924800" y="0"/>
-            <a:ext cx="1219200" cy="762000"/>
+            <a:off x="0" y="1219200"/>
+            <a:ext cx="9144000" cy="5818188"/>
           </a:xfrm>
           <a:prstGeom prst="rect">
             <a:avLst/>
           </a:prstGeom>
         </p:spPr>
-        <p:style>
-          <a:lnRef idx="2">
-            <a:schemeClr val="accent1">
-              <a:shade val="50000"/>
-            </a:schemeClr>
-          </a:lnRef>
-          <a:fillRef idx="1">
-            <a:schemeClr val="accent1"/>
-          </a:fillRef>
-          <a:effectRef idx="0">
-            <a:schemeClr val="accent1"/>
-          </a:effectRef>
-          <a:fontRef idx="minor">
-            <a:schemeClr val="lt1"/>
-          </a:fontRef>
-        </p:style>
-        <p:txBody>
-          <a:bodyPr rtlCol="0" anchor="ctr"/>
-          <a:lstStyle/>
-          <a:p>
-            <a:pPr algn="ctr"/>
-            <a:r>
-              <a:rPr lang="en-US" sz="3200" dirty="0"/>
-              <a:t>#</a:t>
-            </a:r>
-            <a:r>
-              <a:rPr lang="hu-HU" sz="3200" dirty="0"/>
-              <a:t>5</a:t>
-            </a:r>
-            <a:r>
-              <a:rPr lang="en-US" sz="3200" dirty="0"/>
-              <a:t>.</a:t>
-            </a:r>
-            <a:r>
-              <a:rPr lang="hu-HU" sz="3200" dirty="0"/>
-              <a:t>0</a:t>
-            </a:r>
-            <a:endParaRPr lang="en-US" sz="3200" dirty="0"/>
-          </a:p>
-        </p:txBody>
-      </p:sp>
+      </p:pic>
     </p:spTree>
+    <p:extLst>
+      <p:ext uri="{BB962C8B-B14F-4D97-AF65-F5344CB8AC3E}">
+        <p14:creationId xmlns:p14="http://schemas.microsoft.com/office/powerpoint/2010/main" val="2747443551"/>
+      </p:ext>
+    </p:extLst>
   </p:cSld>
   <p:clrMapOvr>
     <a:masterClrMapping/>

</xml_diff>